<commit_message>
[chore] 312.Happy Steps 프로세스정의서.pptx 수정
</commit_message>
<xml_diff>
--- a/resource/30.analysis/310.request/312.Happy Steps]프로세스정의서.pptx
+++ b/resource/30.analysis/310.request/312.Happy Steps]프로세스정의서.pptx
@@ -5867,25 +5867,6 @@
           </a:p>
         </p:txBody>
       </p:sp>
-      <p:sp>
-        <p:nvSpPr>
-          <p:cNvPr id="3" name="부제목 2"/>
-          <p:cNvSpPr>
-            <a:spLocks noGrp="1"/>
-          </p:cNvSpPr>
-          <p:nvPr>
-            <p:ph type="subTitle" idx="1"/>
-          </p:nvPr>
-        </p:nvSpPr>
-        <p:spPr/>
-        <p:txBody>
-          <a:bodyPr/>
-          <a:lstStyle/>
-          <a:p>
-            <a:endParaRPr lang="ko-KR" altLang="en-US" dirty="0"/>
-          </a:p>
-        </p:txBody>
-      </p:sp>
     </p:spTree>
     <p:extLst>
       <p:ext uri="{BB962C8B-B14F-4D97-AF65-F5344CB8AC3E}">
@@ -8486,11 +8467,6 @@
               </a:rPr>
               <a:t>비밀번호 찾기</a:t>
             </a:r>
-            <a:endParaRPr lang="ko-KR" altLang="en-US" sz="1200" dirty="0" smtClean="0">
-              <a:solidFill>
-                <a:schemeClr val="tx1"/>
-              </a:solidFill>
-            </a:endParaRPr>
           </a:p>
         </p:txBody>
       </p:sp>
@@ -8964,9 +8940,7 @@
           </a:prstGeom>
           <a:noFill/>
           <a:ln w="19050">
-            <a:solidFill>
-              <a:schemeClr val="tx1"/>
-            </a:solidFill>
+            <a:noFill/>
           </a:ln>
         </p:spPr>
         <p:txBody>
@@ -9282,12 +9256,6 @@
               </a:rPr>
               <a:t>아이디</a:t>
             </a:r>
-            <a:endParaRPr lang="ko-KR" altLang="en-US" sz="1200" dirty="0" smtClean="0">
-              <a:solidFill>
-                <a:schemeClr val="tx1"/>
-              </a:solidFill>
-              <a:latin typeface="+mn-ea"/>
-            </a:endParaRPr>
           </a:p>
         </p:txBody>
       </p:sp>
@@ -9599,12 +9567,6 @@
               </a:rPr>
               <a:t>비밀번호</a:t>
             </a:r>
-            <a:endParaRPr lang="ko-KR" altLang="en-US" sz="1200" dirty="0" smtClean="0">
-              <a:solidFill>
-                <a:schemeClr val="tx1"/>
-              </a:solidFill>
-              <a:latin typeface="+mn-ea"/>
-            </a:endParaRPr>
           </a:p>
         </p:txBody>
       </p:sp>
@@ -9818,12 +9780,6 @@
               </a:rPr>
               <a:t>닉네임</a:t>
             </a:r>
-            <a:endParaRPr lang="ko-KR" altLang="en-US" sz="1200" dirty="0" smtClean="0">
-              <a:solidFill>
-                <a:schemeClr val="tx1"/>
-              </a:solidFill>
-              <a:latin typeface="+mn-ea"/>
-            </a:endParaRPr>
           </a:p>
         </p:txBody>
       </p:sp>
@@ -9835,8 +9791,8 @@
         </p:nvSpPr>
         <p:spPr>
           <a:xfrm>
-            <a:off x="7455526" y="2504310"/>
-            <a:ext cx="1725904" cy="994395"/>
+            <a:off x="7455526" y="2499050"/>
+            <a:ext cx="1725904" cy="999655"/>
           </a:xfrm>
           <a:prstGeom prst="flowChartDecision">
             <a:avLst/>
@@ -9877,22 +9833,22 @@
           <a:p>
             <a:pPr algn="ctr"/>
             <a:r>
-              <a:rPr lang="ko-KR" altLang="en-US" sz="1000" dirty="0" err="1" smtClean="0">
-                <a:solidFill>
-                  <a:schemeClr val="tx1"/>
-                </a:solidFill>
-                <a:latin typeface="+mn-ea"/>
-              </a:rPr>
-              <a:t>유효성검사</a:t>
-            </a:r>
-            <a:r>
               <a:rPr lang="ko-KR" altLang="en-US" sz="1000" dirty="0" smtClean="0">
                 <a:solidFill>
                   <a:schemeClr val="tx1"/>
                 </a:solidFill>
                 <a:latin typeface="+mn-ea"/>
               </a:rPr>
-              <a:t> 및 </a:t>
+              <a:t>유효성 검사 </a:t>
+            </a:r>
+            <a:r>
+              <a:rPr lang="ko-KR" altLang="en-US" sz="1000" dirty="0" smtClean="0">
+                <a:solidFill>
+                  <a:schemeClr val="tx1"/>
+                </a:solidFill>
+                <a:latin typeface="+mn-ea"/>
+              </a:rPr>
+              <a:t>및 </a:t>
             </a:r>
             <a:r>
               <a:rPr lang="ko-KR" altLang="en-US" sz="1000" dirty="0" err="1" smtClean="0">
@@ -9924,7 +9880,7 @@
         <p:spPr>
           <a:xfrm flipH="1">
             <a:off x="9181430" y="2993600"/>
-            <a:ext cx="270225" cy="7908"/>
+            <a:ext cx="270225" cy="5278"/>
           </a:xfrm>
           <a:prstGeom prst="straightConnector1">
             <a:avLst/>
@@ -10157,9 +10113,9 @@
           <p:nvPr/>
         </p:nvCxnSpPr>
         <p:spPr>
-          <a:xfrm flipH="1" flipV="1">
-            <a:off x="6874625" y="3001507"/>
-            <a:ext cx="580901" cy="1"/>
+          <a:xfrm flipH="1">
+            <a:off x="6874626" y="2998878"/>
+            <a:ext cx="580900" cy="2630"/>
           </a:xfrm>
           <a:prstGeom prst="straightConnector1">
             <a:avLst/>
@@ -10409,160 +10365,6 @@
               </a:rPr>
               <a:t>데이터처리</a:t>
             </a:r>
-            <a:endParaRPr lang="ko-KR" altLang="en-US" sz="1200" dirty="0" smtClean="0">
-              <a:solidFill>
-                <a:schemeClr val="tx1"/>
-              </a:solidFill>
-              <a:latin typeface="+mn-ea"/>
-            </a:endParaRPr>
-          </a:p>
-        </p:txBody>
-      </p:sp>
-      <p:sp>
-        <p:nvSpPr>
-          <p:cNvPr id="85" name="순서도: 대체 처리 84"/>
-          <p:cNvSpPr/>
-          <p:nvPr/>
-        </p:nvSpPr>
-        <p:spPr>
-          <a:xfrm>
-            <a:off x="2543631" y="3644408"/>
-            <a:ext cx="1080000" cy="540000"/>
-          </a:xfrm>
-          <a:prstGeom prst="flowChartAlternateProcess">
-            <a:avLst/>
-          </a:prstGeom>
-          <a:solidFill>
-            <a:schemeClr val="bg1"/>
-          </a:solidFill>
-          <a:ln w="19050">
-            <a:solidFill>
-              <a:schemeClr val="tx1"/>
-            </a:solidFill>
-            <a:prstDash val="sysDot"/>
-          </a:ln>
-        </p:spPr>
-        <p:style>
-          <a:lnRef idx="2">
-            <a:schemeClr val="accent1">
-              <a:shade val="50000"/>
-            </a:schemeClr>
-          </a:lnRef>
-          <a:fillRef idx="1">
-            <a:schemeClr val="accent1"/>
-          </a:fillRef>
-          <a:effectRef idx="0">
-            <a:schemeClr val="accent1"/>
-          </a:effectRef>
-          <a:fontRef idx="minor">
-            <a:schemeClr val="lt1"/>
-          </a:fontRef>
-        </p:style>
-        <p:txBody>
-          <a:bodyPr rot="0" spcFirstLastPara="0" vertOverflow="overflow" horzOverflow="overflow" vert="horz" wrap="square" lIns="91440" tIns="45720" rIns="91440" bIns="45720" numCol="1" spcCol="0" rtlCol="0" fromWordArt="0" anchor="ctr" anchorCtr="0" forceAA="0" compatLnSpc="1">
-            <a:prstTxWarp prst="textNoShape">
-              <a:avLst/>
-            </a:prstTxWarp>
-            <a:noAutofit/>
-          </a:bodyPr>
-          <a:lstStyle/>
-          <a:p>
-            <a:pPr algn="ctr"/>
-            <a:r>
-              <a:rPr lang="ko-KR" altLang="en-US" sz="1200" dirty="0" smtClean="0">
-                <a:solidFill>
-                  <a:schemeClr val="tx1"/>
-                </a:solidFill>
-              </a:rPr>
-              <a:t>회원 </a:t>
-            </a:r>
-            <a:r>
-              <a:rPr lang="ko-KR" altLang="en-US" sz="1200" dirty="0" smtClean="0">
-                <a:solidFill>
-                  <a:schemeClr val="tx1"/>
-                </a:solidFill>
-              </a:rPr>
-              <a:t>가입 성공</a:t>
-            </a:r>
-            <a:endParaRPr lang="ko-KR" altLang="en-US" sz="1200" dirty="0" smtClean="0">
-              <a:solidFill>
-                <a:schemeClr val="tx1"/>
-              </a:solidFill>
-            </a:endParaRPr>
-          </a:p>
-        </p:txBody>
-      </p:sp>
-      <p:sp>
-        <p:nvSpPr>
-          <p:cNvPr id="88" name="순서도: 대체 처리 87"/>
-          <p:cNvSpPr/>
-          <p:nvPr/>
-        </p:nvSpPr>
-        <p:spPr>
-          <a:xfrm>
-            <a:off x="795668" y="4500322"/>
-            <a:ext cx="1080000" cy="540000"/>
-          </a:xfrm>
-          <a:prstGeom prst="flowChartAlternateProcess">
-            <a:avLst/>
-          </a:prstGeom>
-          <a:solidFill>
-            <a:schemeClr val="bg1"/>
-          </a:solidFill>
-          <a:ln w="19050">
-            <a:solidFill>
-              <a:schemeClr val="tx1"/>
-            </a:solidFill>
-            <a:prstDash val="sysDot"/>
-          </a:ln>
-        </p:spPr>
-        <p:style>
-          <a:lnRef idx="2">
-            <a:schemeClr val="accent1">
-              <a:shade val="50000"/>
-            </a:schemeClr>
-          </a:lnRef>
-          <a:fillRef idx="1">
-            <a:schemeClr val="accent1"/>
-          </a:fillRef>
-          <a:effectRef idx="0">
-            <a:schemeClr val="accent1"/>
-          </a:effectRef>
-          <a:fontRef idx="minor">
-            <a:schemeClr val="lt1"/>
-          </a:fontRef>
-        </p:style>
-        <p:txBody>
-          <a:bodyPr rot="0" spcFirstLastPara="0" vertOverflow="overflow" horzOverflow="overflow" vert="horz" wrap="square" lIns="91440" tIns="45720" rIns="91440" bIns="45720" numCol="1" spcCol="0" rtlCol="0" fromWordArt="0" anchor="ctr" anchorCtr="0" forceAA="0" compatLnSpc="1">
-            <a:prstTxWarp prst="textNoShape">
-              <a:avLst/>
-            </a:prstTxWarp>
-            <a:noAutofit/>
-          </a:bodyPr>
-          <a:lstStyle/>
-          <a:p>
-            <a:pPr algn="ctr"/>
-            <a:r>
-              <a:rPr lang="ko-KR" altLang="en-US" sz="1200" dirty="0" smtClean="0">
-                <a:solidFill>
-                  <a:schemeClr val="tx1"/>
-                </a:solidFill>
-              </a:rPr>
-              <a:t>회원 </a:t>
-            </a:r>
-            <a:r>
-              <a:rPr lang="ko-KR" altLang="en-US" sz="1200" dirty="0" smtClean="0">
-                <a:solidFill>
-                  <a:schemeClr val="tx1"/>
-                </a:solidFill>
-              </a:rPr>
-              <a:t>가입 실패</a:t>
-            </a:r>
-            <a:endParaRPr lang="ko-KR" altLang="en-US" sz="1200" dirty="0" smtClean="0">
-              <a:solidFill>
-                <a:schemeClr val="tx1"/>
-              </a:solidFill>
-            </a:endParaRPr>
           </a:p>
         </p:txBody>
       </p:sp>
@@ -10611,8 +10413,8 @@
         </p:nvSpPr>
         <p:spPr>
           <a:xfrm>
-            <a:off x="2058365" y="3606132"/>
-            <a:ext cx="405752" cy="276999"/>
+            <a:off x="2091077" y="3515641"/>
+            <a:ext cx="412063" cy="276999"/>
           </a:xfrm>
           <a:prstGeom prst="rect">
             <a:avLst/>
@@ -10623,7 +10425,7 @@
           </a:ln>
         </p:spPr>
         <p:txBody>
-          <a:bodyPr wrap="none" rtlCol="0">
+          <a:bodyPr wrap="square" rtlCol="0">
             <a:spAutoFit/>
           </a:bodyPr>
           <a:lstStyle/>
@@ -10716,12 +10518,6 @@
               </a:rPr>
               <a:t>무</a:t>
             </a:r>
-            <a:endParaRPr lang="ko-KR" altLang="en-US" sz="1200" dirty="0" smtClean="0">
-              <a:solidFill>
-                <a:schemeClr val="tx1"/>
-              </a:solidFill>
-              <a:latin typeface="+mn-ea"/>
-            </a:endParaRPr>
           </a:p>
         </p:txBody>
       </p:sp>
@@ -10808,7 +10604,6 @@
           <p:cNvPr id="65" name="직선 화살표 연결선 64"/>
           <p:cNvCxnSpPr>
             <a:stCxn id="83" idx="2"/>
-            <a:endCxn id="88" idx="0"/>
           </p:cNvCxnSpPr>
           <p:nvPr/>
         </p:nvCxnSpPr>
@@ -10842,19 +10637,253 @@
           </a:fontRef>
         </p:style>
       </p:cxnSp>
+      <p:sp>
+        <p:nvSpPr>
+          <p:cNvPr id="109" name="TextBox 108"/>
+          <p:cNvSpPr txBox="1"/>
+          <p:nvPr/>
+        </p:nvSpPr>
+        <p:spPr>
+          <a:xfrm>
+            <a:off x="7242541" y="1305496"/>
+            <a:ext cx="405752" cy="276999"/>
+          </a:xfrm>
+          <a:prstGeom prst="rect">
+            <a:avLst/>
+          </a:prstGeom>
+          <a:noFill/>
+          <a:ln w="19050">
+            <a:noFill/>
+          </a:ln>
+        </p:spPr>
+        <p:txBody>
+          <a:bodyPr wrap="none" rtlCol="0">
+            <a:spAutoFit/>
+          </a:bodyPr>
+          <a:lstStyle/>
+          <a:p>
+            <a:r>
+              <a:rPr lang="en-US" altLang="ko-KR" sz="1200" dirty="0" smtClean="0">
+                <a:latin typeface="+mn-ea"/>
+              </a:rPr>
+              <a:t>Yes</a:t>
+            </a:r>
+            <a:endParaRPr lang="ko-KR" altLang="en-US" sz="1200" dirty="0">
+              <a:latin typeface="+mn-ea"/>
+            </a:endParaRPr>
+          </a:p>
+        </p:txBody>
+      </p:sp>
+      <p:sp>
+        <p:nvSpPr>
+          <p:cNvPr id="110" name="TextBox 109"/>
+          <p:cNvSpPr txBox="1"/>
+          <p:nvPr/>
+        </p:nvSpPr>
+        <p:spPr>
+          <a:xfrm>
+            <a:off x="10982445" y="2181531"/>
+            <a:ext cx="405752" cy="276999"/>
+          </a:xfrm>
+          <a:prstGeom prst="rect">
+            <a:avLst/>
+          </a:prstGeom>
+          <a:noFill/>
+          <a:ln w="19050">
+            <a:noFill/>
+          </a:ln>
+        </p:spPr>
+        <p:txBody>
+          <a:bodyPr wrap="none" rtlCol="0">
+            <a:spAutoFit/>
+          </a:bodyPr>
+          <a:lstStyle/>
+          <a:p>
+            <a:r>
+              <a:rPr lang="en-US" altLang="ko-KR" sz="1200" dirty="0" smtClean="0">
+                <a:latin typeface="+mn-ea"/>
+              </a:rPr>
+              <a:t>Yes</a:t>
+            </a:r>
+            <a:endParaRPr lang="ko-KR" altLang="en-US" sz="1200" dirty="0">
+              <a:latin typeface="+mn-ea"/>
+            </a:endParaRPr>
+          </a:p>
+        </p:txBody>
+      </p:sp>
+      <p:sp>
+        <p:nvSpPr>
+          <p:cNvPr id="111" name="TextBox 110"/>
+          <p:cNvSpPr txBox="1"/>
+          <p:nvPr/>
+        </p:nvSpPr>
+        <p:spPr>
+          <a:xfrm>
+            <a:off x="6997098" y="2684697"/>
+            <a:ext cx="405752" cy="276999"/>
+          </a:xfrm>
+          <a:prstGeom prst="rect">
+            <a:avLst/>
+          </a:prstGeom>
+          <a:noFill/>
+          <a:ln w="19050">
+            <a:noFill/>
+          </a:ln>
+        </p:spPr>
+        <p:txBody>
+          <a:bodyPr wrap="none" rtlCol="0">
+            <a:spAutoFit/>
+          </a:bodyPr>
+          <a:lstStyle/>
+          <a:p>
+            <a:r>
+              <a:rPr lang="en-US" altLang="ko-KR" sz="1200" dirty="0" smtClean="0">
+                <a:latin typeface="+mn-ea"/>
+              </a:rPr>
+              <a:t>Yes</a:t>
+            </a:r>
+            <a:endParaRPr lang="ko-KR" altLang="en-US" sz="1200" dirty="0">
+              <a:latin typeface="+mn-ea"/>
+            </a:endParaRPr>
+          </a:p>
+        </p:txBody>
+      </p:sp>
+      <p:sp>
+        <p:nvSpPr>
+          <p:cNvPr id="44" name="타원 43"/>
+          <p:cNvSpPr/>
+          <p:nvPr/>
+        </p:nvSpPr>
+        <p:spPr>
+          <a:xfrm>
+            <a:off x="2619831" y="3509974"/>
+            <a:ext cx="845925" cy="811706"/>
+          </a:xfrm>
+          <a:prstGeom prst="ellipse">
+            <a:avLst/>
+          </a:prstGeom>
+          <a:solidFill>
+            <a:schemeClr val="bg1"/>
+          </a:solidFill>
+          <a:ln>
+            <a:solidFill>
+              <a:schemeClr val="tx1"/>
+            </a:solidFill>
+          </a:ln>
+        </p:spPr>
+        <p:style>
+          <a:lnRef idx="2">
+            <a:schemeClr val="accent1">
+              <a:shade val="50000"/>
+            </a:schemeClr>
+          </a:lnRef>
+          <a:fillRef idx="1">
+            <a:schemeClr val="accent1"/>
+          </a:fillRef>
+          <a:effectRef idx="0">
+            <a:schemeClr val="accent1"/>
+          </a:effectRef>
+          <a:fontRef idx="minor">
+            <a:schemeClr val="lt1"/>
+          </a:fontRef>
+        </p:style>
+        <p:txBody>
+          <a:bodyPr rtlCol="0" anchor="ctr"/>
+          <a:lstStyle/>
+          <a:p>
+            <a:pPr algn="ctr"/>
+            <a:r>
+              <a:rPr lang="ko-KR" altLang="en-US" sz="1200" dirty="0">
+                <a:solidFill>
+                  <a:schemeClr val="tx1"/>
+                </a:solidFill>
+              </a:rPr>
+              <a:t>회원 가입 성공</a:t>
+            </a:r>
+          </a:p>
+        </p:txBody>
+      </p:sp>
+      <p:sp>
+        <p:nvSpPr>
+          <p:cNvPr id="49" name="타원 48"/>
+          <p:cNvSpPr/>
+          <p:nvPr/>
+        </p:nvSpPr>
+        <p:spPr>
+          <a:xfrm>
+            <a:off x="912705" y="4508364"/>
+            <a:ext cx="845925" cy="819823"/>
+          </a:xfrm>
+          <a:prstGeom prst="ellipse">
+            <a:avLst/>
+          </a:prstGeom>
+          <a:solidFill>
+            <a:schemeClr val="bg1"/>
+          </a:solidFill>
+          <a:ln>
+            <a:solidFill>
+              <a:schemeClr val="tx1"/>
+            </a:solidFill>
+          </a:ln>
+        </p:spPr>
+        <p:style>
+          <a:lnRef idx="2">
+            <a:schemeClr val="accent1">
+              <a:shade val="50000"/>
+            </a:schemeClr>
+          </a:lnRef>
+          <a:fillRef idx="1">
+            <a:schemeClr val="accent1"/>
+          </a:fillRef>
+          <a:effectRef idx="0">
+            <a:schemeClr val="accent1"/>
+          </a:effectRef>
+          <a:fontRef idx="minor">
+            <a:schemeClr val="lt1"/>
+          </a:fontRef>
+        </p:style>
+        <p:txBody>
+          <a:bodyPr rtlCol="0" anchor="ctr"/>
+          <a:lstStyle/>
+          <a:p>
+            <a:pPr algn="ctr"/>
+            <a:r>
+              <a:rPr lang="ko-KR" altLang="en-US" sz="1200" dirty="0">
+                <a:solidFill>
+                  <a:schemeClr val="tx1"/>
+                </a:solidFill>
+              </a:rPr>
+              <a:t>회원 가입 </a:t>
+            </a:r>
+            <a:r>
+              <a:rPr lang="ko-KR" altLang="en-US" sz="1200" dirty="0" smtClean="0">
+                <a:solidFill>
+                  <a:schemeClr val="tx1"/>
+                </a:solidFill>
+              </a:rPr>
+              <a:t>실패</a:t>
+            </a:r>
+            <a:endParaRPr lang="ko-KR" altLang="en-US" sz="1200" dirty="0">
+              <a:solidFill>
+                <a:schemeClr val="tx1"/>
+              </a:solidFill>
+            </a:endParaRPr>
+          </a:p>
+        </p:txBody>
+      </p:sp>
       <p:cxnSp>
         <p:nvCxnSpPr>
-          <p:cNvPr id="68" name="직선 화살표 연결선 67"/>
+          <p:cNvPr id="15" name="직선 화살표 연결선 14"/>
           <p:cNvCxnSpPr>
             <a:stCxn id="83" idx="3"/>
-            <a:endCxn id="85" idx="1"/>
+            <a:endCxn id="44" idx="2"/>
           </p:cNvCxnSpPr>
           <p:nvPr/>
         </p:nvCxnSpPr>
         <p:spPr>
           <a:xfrm>
             <a:off x="2058365" y="3914408"/>
-            <a:ext cx="485266" cy="0"/>
+            <a:ext cx="561466" cy="1419"/>
           </a:xfrm>
           <a:prstGeom prst="straightConnector1">
             <a:avLst/>
@@ -10881,117 +10910,6 @@
           </a:fontRef>
         </p:style>
       </p:cxnSp>
-      <p:sp>
-        <p:nvSpPr>
-          <p:cNvPr id="109" name="TextBox 108"/>
-          <p:cNvSpPr txBox="1"/>
-          <p:nvPr/>
-        </p:nvSpPr>
-        <p:spPr>
-          <a:xfrm>
-            <a:off x="7242541" y="1305496"/>
-            <a:ext cx="405752" cy="276999"/>
-          </a:xfrm>
-          <a:prstGeom prst="rect">
-            <a:avLst/>
-          </a:prstGeom>
-          <a:noFill/>
-          <a:ln w="19050">
-            <a:noFill/>
-          </a:ln>
-        </p:spPr>
-        <p:txBody>
-          <a:bodyPr wrap="none" rtlCol="0">
-            <a:spAutoFit/>
-          </a:bodyPr>
-          <a:lstStyle/>
-          <a:p>
-            <a:r>
-              <a:rPr lang="en-US" altLang="ko-KR" sz="1200" dirty="0" smtClean="0">
-                <a:latin typeface="+mn-ea"/>
-              </a:rPr>
-              <a:t>Yes</a:t>
-            </a:r>
-            <a:endParaRPr lang="ko-KR" altLang="en-US" sz="1200" dirty="0">
-              <a:latin typeface="+mn-ea"/>
-            </a:endParaRPr>
-          </a:p>
-        </p:txBody>
-      </p:sp>
-      <p:sp>
-        <p:nvSpPr>
-          <p:cNvPr id="110" name="TextBox 109"/>
-          <p:cNvSpPr txBox="1"/>
-          <p:nvPr/>
-        </p:nvSpPr>
-        <p:spPr>
-          <a:xfrm>
-            <a:off x="10982445" y="2181531"/>
-            <a:ext cx="405752" cy="276999"/>
-          </a:xfrm>
-          <a:prstGeom prst="rect">
-            <a:avLst/>
-          </a:prstGeom>
-          <a:noFill/>
-          <a:ln w="19050">
-            <a:noFill/>
-          </a:ln>
-        </p:spPr>
-        <p:txBody>
-          <a:bodyPr wrap="none" rtlCol="0">
-            <a:spAutoFit/>
-          </a:bodyPr>
-          <a:lstStyle/>
-          <a:p>
-            <a:r>
-              <a:rPr lang="en-US" altLang="ko-KR" sz="1200" dirty="0" smtClean="0">
-                <a:latin typeface="+mn-ea"/>
-              </a:rPr>
-              <a:t>Yes</a:t>
-            </a:r>
-            <a:endParaRPr lang="ko-KR" altLang="en-US" sz="1200" dirty="0">
-              <a:latin typeface="+mn-ea"/>
-            </a:endParaRPr>
-          </a:p>
-        </p:txBody>
-      </p:sp>
-      <p:sp>
-        <p:nvSpPr>
-          <p:cNvPr id="111" name="TextBox 110"/>
-          <p:cNvSpPr txBox="1"/>
-          <p:nvPr/>
-        </p:nvSpPr>
-        <p:spPr>
-          <a:xfrm>
-            <a:off x="6997098" y="2684697"/>
-            <a:ext cx="405752" cy="276999"/>
-          </a:xfrm>
-          <a:prstGeom prst="rect">
-            <a:avLst/>
-          </a:prstGeom>
-          <a:noFill/>
-          <a:ln w="19050">
-            <a:noFill/>
-          </a:ln>
-        </p:spPr>
-        <p:txBody>
-          <a:bodyPr wrap="none" rtlCol="0">
-            <a:spAutoFit/>
-          </a:bodyPr>
-          <a:lstStyle/>
-          <a:p>
-            <a:r>
-              <a:rPr lang="en-US" altLang="ko-KR" sz="1200" dirty="0" smtClean="0">
-                <a:latin typeface="+mn-ea"/>
-              </a:rPr>
-              <a:t>Yes</a:t>
-            </a:r>
-            <a:endParaRPr lang="ko-KR" altLang="en-US" sz="1200" dirty="0">
-              <a:latin typeface="+mn-ea"/>
-            </a:endParaRPr>
-          </a:p>
-        </p:txBody>
-      </p:sp>
     </p:spTree>
     <p:extLst>
       <p:ext uri="{BB962C8B-B14F-4D97-AF65-F5344CB8AC3E}">

</xml_diff>